<commit_message>
Python List ppt and Assignment
</commit_message>
<xml_diff>
--- a/Presentations/String.pptx
+++ b/Presentations/String.pptx
@@ -265,7 +265,7 @@
             <a:fld id="{1D8BD707-D9CF-40AE-B4C6-C98DA3205C09}" type="datetimeFigureOut">
               <a:rPr lang="en-US"/>
               <a:pPr/>
-              <a:t>8/9/2019</a:t>
+              <a:t>8/20/2019</a:t>
             </a:fld>
             <a:endParaRPr lang="en-US"/>
           </a:p>
@@ -443,7 +443,7 @@
             <a:fld id="{1D8BD707-D9CF-40AE-B4C6-C98DA3205C09}" type="datetimeFigureOut">
               <a:rPr lang="en-US"/>
               <a:pPr/>
-              <a:t>8/9/2019</a:t>
+              <a:t>8/20/2019</a:t>
             </a:fld>
             <a:endParaRPr lang="en-US"/>
           </a:p>
@@ -660,7 +660,7 @@
             <a:fld id="{1D8BD707-D9CF-40AE-B4C6-C98DA3205C09}" type="datetimeFigureOut">
               <a:rPr lang="en-US"/>
               <a:pPr/>
-              <a:t>8/9/2019</a:t>
+              <a:t>8/20/2019</a:t>
             </a:fld>
             <a:endParaRPr lang="en-US"/>
           </a:p>
@@ -811,7 +811,7 @@
             <a:fld id="{1D8BD707-D9CF-40AE-B4C6-C98DA3205C09}" type="datetimeFigureOut">
               <a:rPr lang="en-US"/>
               <a:pPr/>
-              <a:t>8/9/2019</a:t>
+              <a:t>8/20/2019</a:t>
             </a:fld>
             <a:endParaRPr lang="en-US"/>
           </a:p>
@@ -1062,7 +1062,7 @@
             <a:fld id="{1D8BD707-D9CF-40AE-B4C6-C98DA3205C09}" type="datetimeFigureOut">
               <a:rPr lang="en-US"/>
               <a:pPr/>
-              <a:t>8/9/2019</a:t>
+              <a:t>8/20/2019</a:t>
             </a:fld>
             <a:endParaRPr lang="en-US"/>
           </a:p>
@@ -1288,7 +1288,7 @@
             <a:fld id="{1D8BD707-D9CF-40AE-B4C6-C98DA3205C09}" type="datetimeFigureOut">
               <a:rPr lang="en-US"/>
               <a:pPr/>
-              <a:t>8/9/2019</a:t>
+              <a:t>8/20/2019</a:t>
             </a:fld>
             <a:endParaRPr lang="en-US"/>
           </a:p>
@@ -6102,7 +6102,41 @@
                 <a:latin typeface="Calibri"/>
                 <a:cs typeface="Calibri"/>
               </a:rPr>
-              <a:t>A string object has a number of functions and methods. The string functions </a:t>
+              <a:t>A string object has a number of </a:t>
+            </a:r>
+            <a:r>
+              <a:rPr sz="1600" spc="-5" dirty="0">
+                <a:solidFill>
+                  <a:srgbClr val="FF0000"/>
+                </a:solidFill>
+                <a:latin typeface="Calibri"/>
+                <a:cs typeface="Calibri"/>
+              </a:rPr>
+              <a:t>functions</a:t>
+            </a:r>
+            <a:r>
+              <a:rPr sz="1600" spc="-5" dirty="0">
+                <a:latin typeface="Calibri"/>
+                <a:cs typeface="Calibri"/>
+              </a:rPr>
+              <a:t> and </a:t>
+            </a:r>
+            <a:r>
+              <a:rPr sz="1600" spc="-5" dirty="0">
+                <a:solidFill>
+                  <a:srgbClr val="FF0000"/>
+                </a:solidFill>
+                <a:latin typeface="Calibri"/>
+                <a:cs typeface="Calibri"/>
+              </a:rPr>
+              <a:t>methods</a:t>
+            </a:r>
+            <a:r>
+              <a:rPr sz="1600" spc="-5" dirty="0">
+                <a:latin typeface="Calibri"/>
+                <a:cs typeface="Calibri"/>
+              </a:rPr>
+              <a:t>. The string functions </a:t>
             </a:r>
             <a:r>
               <a:rPr sz="1600" spc="-10" dirty="0">
@@ -6190,10 +6224,20 @@
             </a:r>
             <a:r>
               <a:rPr sz="1600" spc="-5" dirty="0">
-                <a:latin typeface="Calibri"/>
-                <a:cs typeface="Calibri"/>
-              </a:rPr>
-              <a:t>len()  function.</a:t>
+                <a:solidFill>
+                  <a:srgbClr val="FF0000"/>
+                </a:solidFill>
+                <a:latin typeface="Calibri"/>
+                <a:cs typeface="Calibri"/>
+              </a:rPr>
+              <a:t>len()</a:t>
+            </a:r>
+            <a:r>
+              <a:rPr sz="1600" spc="-5" dirty="0">
+                <a:latin typeface="Calibri"/>
+                <a:cs typeface="Calibri"/>
+              </a:rPr>
+              <a:t>  function.</a:t>
             </a:r>
             <a:endParaRPr sz="1600">
               <a:latin typeface="Calibri"/>
@@ -6212,7 +6256,7 @@
         </p:nvGraphicFramePr>
         <p:xfrm>
           <a:off x="527050" y="1746250"/>
-          <a:ext cx="8229600" cy="4580431"/>
+          <a:ext cx="8229600" cy="4654599"/>
         </p:xfrm>
         <a:graphic>
           <a:graphicData uri="http://schemas.openxmlformats.org/drawingml/2006/table">
@@ -6344,7 +6388,7 @@
                   </a:tcPr>
                 </a:tc>
               </a:tr>
-              <a:tr h="731520">
+              <a:tr h="805688">
                 <a:tc>
                   <a:txBody>
                     <a:bodyPr/>
@@ -7986,6 +8030,13 @@
   <p:clrMapOvr>
     <a:masterClrMapping/>
   </p:clrMapOvr>
+  <p:timing>
+    <p:tnLst>
+      <p:par>
+        <p:cTn id="1" dur="indefinite" restart="never" nodeType="tmRoot"/>
+      </p:par>
+    </p:tnLst>
+  </p:timing>
 </p:sld>
 </file>
 
@@ -10120,6 +10171,13 @@
   <p:clrMapOvr>
     <a:masterClrMapping/>
   </p:clrMapOvr>
+  <p:timing>
+    <p:tnLst>
+      <p:par>
+        <p:cTn id="1" dur="indefinite" restart="never" nodeType="tmRoot"/>
+      </p:par>
+    </p:tnLst>
+  </p:timing>
 </p:sld>
 </file>
 
@@ -10517,6 +10575,13 @@
   <p:clrMapOvr>
     <a:masterClrMapping/>
   </p:clrMapOvr>
+  <p:timing>
+    <p:tnLst>
+      <p:par>
+        <p:cTn id="1" dur="indefinite" restart="never" nodeType="tmRoot"/>
+      </p:par>
+    </p:tnLst>
+  </p:timing>
 </p:sld>
 </file>
 
@@ -10922,6 +10987,13 @@
   <p:clrMapOvr>
     <a:masterClrMapping/>
   </p:clrMapOvr>
+  <p:timing>
+    <p:tnLst>
+      <p:par>
+        <p:cTn id="1" dur="indefinite" restart="never" nodeType="tmRoot"/>
+      </p:par>
+    </p:tnLst>
+  </p:timing>
 </p:sld>
 </file>
 
@@ -11307,6 +11379,13 @@
   <p:clrMapOvr>
     <a:masterClrMapping/>
   </p:clrMapOvr>
+  <p:timing>
+    <p:tnLst>
+      <p:par>
+        <p:cTn id="1" dur="indefinite" restart="never" nodeType="tmRoot"/>
+      </p:par>
+    </p:tnLst>
+  </p:timing>
 </p:sld>
 </file>
 
@@ -12383,6 +12462,13 @@
   <p:clrMapOvr>
     <a:masterClrMapping/>
   </p:clrMapOvr>
+  <p:timing>
+    <p:tnLst>
+      <p:par>
+        <p:cTn id="1" dur="indefinite" restart="never" nodeType="tmRoot"/>
+      </p:par>
+    </p:tnLst>
+  </p:timing>
 </p:sld>
 </file>
 
@@ -13541,6 +13627,13 @@
   <p:clrMapOvr>
     <a:masterClrMapping/>
   </p:clrMapOvr>
+  <p:timing>
+    <p:tnLst>
+      <p:par>
+        <p:cTn id="1" dur="indefinite" restart="never" nodeType="tmRoot"/>
+      </p:par>
+    </p:tnLst>
+  </p:timing>
 </p:sld>
 </file>
 
@@ -25805,14 +25898,14 @@
               </a:spcBef>
             </a:pPr>
             <a:r>
-              <a:rPr sz="1600" spc="-5" dirty="0">
+              <a:rPr sz="1600" spc="-5" smtClean="0">
                 <a:latin typeface="Calibri"/>
                 <a:cs typeface="Calibri"/>
               </a:rPr>
               <a:t>str1 = </a:t>
             </a:r>
             <a:r>
-              <a:rPr sz="1600" spc="-5" dirty="0">
+              <a:rPr sz="1600" spc="-5" smtClean="0">
                 <a:solidFill>
                   <a:srgbClr val="C00000"/>
                 </a:solidFill>
@@ -25822,14 +25915,14 @@
               <a:t>input</a:t>
             </a:r>
             <a:r>
-              <a:rPr sz="1600" spc="-5" dirty="0">
+              <a:rPr sz="1600" spc="-5" smtClean="0">
                 <a:latin typeface="Calibri"/>
                 <a:cs typeface="Calibri"/>
               </a:rPr>
               <a:t>(</a:t>
             </a:r>
             <a:r>
-              <a:rPr sz="1600" spc="-5" dirty="0">
+              <a:rPr sz="1600" spc="-5" smtClean="0">
                 <a:solidFill>
                   <a:srgbClr val="006FC0"/>
                 </a:solidFill>
@@ -25839,7 +25932,7 @@
               <a:t>"Enter a string:</a:t>
             </a:r>
             <a:r>
-              <a:rPr sz="1600" spc="-75" dirty="0">
+              <a:rPr sz="1600" spc="-75" smtClean="0">
                 <a:solidFill>
                   <a:srgbClr val="006FC0"/>
                 </a:solidFill>
@@ -25849,7 +25942,7 @@
               <a:t> </a:t>
             </a:r>
             <a:r>
-              <a:rPr sz="1600" spc="-5" dirty="0">
+              <a:rPr sz="1600" spc="-5" smtClean="0">
                 <a:solidFill>
                   <a:srgbClr val="006FC0"/>
                 </a:solidFill>
@@ -25859,41 +25952,41 @@
               <a:t>"</a:t>
             </a:r>
             <a:r>
-              <a:rPr sz="1600" spc="-5" dirty="0">
+              <a:rPr sz="1600" spc="-5" smtClean="0">
                 <a:latin typeface="Calibri"/>
                 <a:cs typeface="Calibri"/>
               </a:rPr>
               <a:t>)  </a:t>
             </a:r>
             <a:r>
-              <a:rPr sz="1600" spc="-10" dirty="0">
+              <a:rPr sz="1600" spc="-10" smtClean="0">
                 <a:latin typeface="Calibri"/>
                 <a:cs typeface="Calibri"/>
               </a:rPr>
               <a:t>count </a:t>
             </a:r>
             <a:r>
-              <a:rPr sz="1600" spc="-5" dirty="0">
+              <a:rPr sz="1600" spc="-5" smtClean="0">
                 <a:latin typeface="Calibri"/>
                 <a:cs typeface="Calibri"/>
               </a:rPr>
               <a:t>=</a:t>
             </a:r>
             <a:r>
-              <a:rPr sz="1600" spc="5" dirty="0">
+              <a:rPr sz="1600" spc="5" smtClean="0">
                 <a:latin typeface="Calibri"/>
                 <a:cs typeface="Calibri"/>
               </a:rPr>
               <a:t> </a:t>
             </a:r>
             <a:r>
-              <a:rPr sz="1600" spc="-5" dirty="0">
+              <a:rPr sz="1600" spc="-5" smtClean="0">
                 <a:latin typeface="Calibri"/>
                 <a:cs typeface="Calibri"/>
               </a:rPr>
               <a:t>0</a:t>
             </a:r>
-            <a:endParaRPr sz="1600">
+            <a:endParaRPr sz="1600" smtClean="0">
               <a:latin typeface="Calibri"/>
               <a:cs typeface="Calibri"/>
             </a:endParaRPr>
@@ -25908,7 +26001,7 @@
               </a:spcBef>
             </a:pPr>
             <a:r>
-              <a:rPr sz="1600" spc="-15" dirty="0">
+              <a:rPr sz="1600" spc="-15" smtClean="0">
                 <a:solidFill>
                   <a:srgbClr val="C00000"/>
                 </a:solidFill>
@@ -25918,14 +26011,14 @@
               <a:t>for </a:t>
             </a:r>
             <a:r>
-              <a:rPr sz="1600" spc="-5" dirty="0">
+              <a:rPr sz="1600" spc="-5" smtClean="0">
                 <a:latin typeface="Calibri"/>
                 <a:cs typeface="Calibri"/>
               </a:rPr>
               <a:t>ctr </a:t>
             </a:r>
             <a:r>
-              <a:rPr sz="1600" dirty="0">
+              <a:rPr sz="1600" smtClean="0">
                 <a:solidFill>
                   <a:srgbClr val="C00000"/>
                 </a:solidFill>
@@ -25935,27 +26028,27 @@
               <a:t>in </a:t>
             </a:r>
             <a:r>
-              <a:rPr sz="1600" spc="-10" dirty="0">
+              <a:rPr sz="1600" spc="-10" smtClean="0">
                 <a:latin typeface="Calibri"/>
                 <a:cs typeface="Calibri"/>
               </a:rPr>
               <a:t>str1</a:t>
             </a:r>
             <a:r>
-              <a:rPr sz="1600" spc="-40" dirty="0">
+              <a:rPr sz="1600" spc="-40" smtClean="0">
                 <a:latin typeface="Calibri"/>
                 <a:cs typeface="Calibri"/>
               </a:rPr>
               <a:t> </a:t>
             </a:r>
             <a:r>
-              <a:rPr sz="1600" spc="-5" dirty="0">
+              <a:rPr sz="1600" spc="-5" smtClean="0">
                 <a:latin typeface="Calibri"/>
                 <a:cs typeface="Calibri"/>
               </a:rPr>
               <a:t>:</a:t>
             </a:r>
-            <a:endParaRPr sz="1600">
+            <a:endParaRPr sz="1600" smtClean="0">
               <a:latin typeface="Calibri"/>
               <a:cs typeface="Calibri"/>
             </a:endParaRPr>
@@ -25970,41 +26063,41 @@
               </a:spcBef>
             </a:pPr>
             <a:r>
-              <a:rPr sz="1600" spc="-20" dirty="0">
+              <a:rPr sz="1600" spc="-20" smtClean="0">
                 <a:latin typeface="Calibri"/>
                 <a:cs typeface="Calibri"/>
               </a:rPr>
               <a:t>c</a:t>
             </a:r>
             <a:r>
-              <a:rPr sz="1600" spc="-10" dirty="0">
+              <a:rPr sz="1600" spc="-10" smtClean="0">
                 <a:latin typeface="Calibri"/>
                 <a:cs typeface="Calibri"/>
               </a:rPr>
               <a:t>ou</a:t>
             </a:r>
             <a:r>
-              <a:rPr sz="1600" spc="-20" dirty="0">
+              <a:rPr sz="1600" spc="-20" smtClean="0">
                 <a:latin typeface="Calibri"/>
                 <a:cs typeface="Calibri"/>
               </a:rPr>
               <a:t>n</a:t>
             </a:r>
             <a:r>
-              <a:rPr sz="1600" dirty="0">
+              <a:rPr sz="1600" smtClean="0">
                 <a:latin typeface="Calibri"/>
                 <a:cs typeface="Calibri"/>
               </a:rPr>
               <a:t>t</a:t>
             </a:r>
             <a:r>
-              <a:rPr sz="1600" spc="-10" dirty="0">
+              <a:rPr sz="1600" spc="-10" smtClean="0">
                 <a:latin typeface="Calibri"/>
                 <a:cs typeface="Calibri"/>
               </a:rPr>
               <a:t>+=1</a:t>
             </a:r>
-            <a:endParaRPr sz="1600">
+            <a:endParaRPr sz="1600" smtClean="0">
               <a:latin typeface="Calibri"/>
               <a:cs typeface="Calibri"/>
             </a:endParaRPr>
@@ -26019,7 +26112,7 @@
               </a:spcBef>
             </a:pPr>
             <a:r>
-              <a:rPr sz="1600" spc="-5" dirty="0">
+              <a:rPr sz="1600" spc="-5" smtClean="0">
                 <a:solidFill>
                   <a:srgbClr val="C00000"/>
                 </a:solidFill>
@@ -26029,14 +26122,14 @@
               <a:t>print </a:t>
             </a:r>
             <a:r>
-              <a:rPr sz="1600" spc="-30" dirty="0">
+              <a:rPr sz="1600" spc="-30" smtClean="0">
                 <a:latin typeface="Calibri"/>
                 <a:cs typeface="Calibri"/>
               </a:rPr>
               <a:t>(</a:t>
             </a:r>
             <a:r>
-              <a:rPr sz="1600" spc="-30" dirty="0">
+              <a:rPr sz="1600" spc="-30" smtClean="0">
                 <a:solidFill>
                   <a:srgbClr val="006FC0"/>
                 </a:solidFill>
@@ -26046,7 +26139,7 @@
               <a:t>"Total </a:t>
             </a:r>
             <a:r>
-              <a:rPr sz="1600" spc="-10" dirty="0">
+              <a:rPr sz="1600" spc="-10" smtClean="0">
                 <a:solidFill>
                   <a:srgbClr val="006FC0"/>
                 </a:solidFill>
@@ -26056,7 +26149,7 @@
               <a:t>number </a:t>
             </a:r>
             <a:r>
-              <a:rPr sz="1600" spc="-5" dirty="0">
+              <a:rPr sz="1600" spc="-5" smtClean="0">
                 <a:solidFill>
                   <a:srgbClr val="006FC0"/>
                 </a:solidFill>
@@ -26066,7 +26159,7 @@
               <a:t>of </a:t>
             </a:r>
             <a:r>
-              <a:rPr sz="1600" spc="-10" dirty="0">
+              <a:rPr sz="1600" spc="-10" smtClean="0">
                 <a:solidFill>
                   <a:srgbClr val="006FC0"/>
                 </a:solidFill>
@@ -26076,7 +26169,7 @@
               <a:t>characters: </a:t>
             </a:r>
             <a:r>
-              <a:rPr sz="1600" dirty="0">
+              <a:rPr sz="1600" smtClean="0">
                 <a:solidFill>
                   <a:srgbClr val="006FC0"/>
                 </a:solidFill>
@@ -26086,21 +26179,21 @@
               <a:t>"</a:t>
             </a:r>
             <a:r>
-              <a:rPr sz="1600" dirty="0">
+              <a:rPr sz="1600" smtClean="0">
                 <a:latin typeface="Calibri"/>
                 <a:cs typeface="Calibri"/>
               </a:rPr>
               <a:t>,</a:t>
             </a:r>
             <a:r>
-              <a:rPr sz="1600" spc="40" dirty="0">
+              <a:rPr sz="1600" spc="40" smtClean="0">
                 <a:latin typeface="Calibri"/>
                 <a:cs typeface="Calibri"/>
               </a:rPr>
               <a:t> </a:t>
             </a:r>
             <a:r>
-              <a:rPr sz="1600" spc="-10" dirty="0">
+              <a:rPr sz="1600" spc="-10" smtClean="0">
                 <a:latin typeface="Calibri"/>
                 <a:cs typeface="Calibri"/>
               </a:rPr>

</xml_diff>